<commit_message>
Update Files and Information
</commit_message>
<xml_diff>
--- a/_self/_for_working/_cv/_making/_cv_for_work.pptx
+++ b/_self/_for_working/_cv/_making/_cv_for_work.pptx
@@ -1173,7 +1173,7 @@
           </a:ln>
           <a:extLst>
             <a:ext uri="{C572A759-6A51-4108-AA02-DFA0A04FC94B}">
-              <ma14:wrappingTextBoxFlag xmlns="" xmlns:m="http://schemas.openxmlformats.org/officeDocument/2006/math" xmlns:a14="http://schemas.microsoft.com/office/drawing/2010/main" xmlns:ma14="http://schemas.microsoft.com/office/mac/drawingml/2011/main" val="1"/>
+              <ma14:wrappingTextBoxFlag xmlns:ma14="http://schemas.microsoft.com/office/mac/drawingml/2011/main" xmlns:a14="http://schemas.microsoft.com/office/drawing/2010/main" xmlns:m="http://schemas.openxmlformats.org/officeDocument/2006/math" xmlns="" val="1"/>
             </a:ext>
           </a:extLst>
         </p:spPr>
@@ -1520,7 +1520,7 @@
           </a:ln>
           <a:extLst>
             <a:ext uri="{C572A759-6A51-4108-AA02-DFA0A04FC94B}">
-              <ma14:wrappingTextBoxFlag xmlns="" xmlns:m="http://schemas.openxmlformats.org/officeDocument/2006/math" xmlns:a14="http://schemas.microsoft.com/office/drawing/2010/main" xmlns:ma14="http://schemas.microsoft.com/office/mac/drawingml/2011/main" val="1"/>
+              <ma14:wrappingTextBoxFlag xmlns:ma14="http://schemas.microsoft.com/office/mac/drawingml/2011/main" xmlns:a14="http://schemas.microsoft.com/office/drawing/2010/main" xmlns:m="http://schemas.openxmlformats.org/officeDocument/2006/math" xmlns="" val="1"/>
             </a:ext>
           </a:extLst>
         </p:spPr>
@@ -2529,10 +2529,10 @@
         </p:nvGrpSpPr>
         <p:grpSpPr>
           <a:xfrm>
-            <a:off x="2560320" y="6675118"/>
-            <a:ext cx="4163547" cy="1253355"/>
-            <a:chOff x="298350" y="6226435"/>
-            <a:chExt cx="2284839" cy="1357802"/>
+            <a:off x="2550157" y="6840962"/>
+            <a:ext cx="4170683" cy="1249635"/>
+            <a:chOff x="292773" y="6226435"/>
+            <a:chExt cx="2288755" cy="1353772"/>
           </a:xfrm>
         </p:grpSpPr>
         <p:sp>
@@ -2560,7 +2560,7 @@
             </a:ln>
             <a:extLst>
               <a:ext uri="{C572A759-6A51-4108-AA02-DFA0A04FC94B}">
-                <ma14:wrappingTextBoxFlag xmlns="" xmlns:m="http://schemas.openxmlformats.org/officeDocument/2006/math" xmlns:a14="http://schemas.microsoft.com/office/drawing/2010/main" xmlns:ma14="http://schemas.microsoft.com/office/mac/drawingml/2011/main" val="1"/>
+                <ma14:wrappingTextBoxFlag xmlns:ma14="http://schemas.microsoft.com/office/mac/drawingml/2011/main" xmlns:a14="http://schemas.microsoft.com/office/drawing/2010/main" xmlns:m="http://schemas.openxmlformats.org/officeDocument/2006/math" xmlns="" val="1"/>
               </a:ext>
             </a:extLst>
           </p:spPr>
@@ -2633,8 +2633,8 @@
           </p:nvSpPr>
           <p:spPr>
             <a:xfrm>
-              <a:off x="298350" y="6622677"/>
-              <a:ext cx="2284839" cy="961560"/>
+              <a:off x="292773" y="6618645"/>
+              <a:ext cx="2284839" cy="961562"/>
             </a:xfrm>
             <a:prstGeom prst="rect">
               <a:avLst/>
@@ -2684,7 +2684,7 @@
                   <a:cs typeface="Arial" panose="020B0604020202020204" pitchFamily="34" charset="0"/>
                   <a:sym typeface="Helvetica Neue Medium"/>
                 </a:rPr>
-                <a:t>Linux basic (Udemy)</a:t>
+                <a:t>Functional Programming in C++ (Udemy)</a:t>
               </a:r>
             </a:p>
             <a:p>
@@ -2703,7 +2703,7 @@
                   <a:cs typeface="Arial" panose="020B0604020202020204" pitchFamily="34" charset="0"/>
                   <a:sym typeface="Helvetica Neue Medium"/>
                 </a:rPr>
-                <a:t>Linux device driver programmer (Udemy)</a:t>
+                <a:t>C++ in Advanced (Udemy)</a:t>
               </a:r>
             </a:p>
             <a:p>
@@ -2722,7 +2722,7 @@
                   <a:cs typeface="Arial" panose="020B0604020202020204" pitchFamily="34" charset="0"/>
                   <a:sym typeface="Helvetica Neue Medium"/>
                 </a:rPr>
-                <a:t>Practical OpenGL and GLSL shaders fundamentals with C++ (Udemy)</a:t>
+                <a:t>Fundamental on Linux (Udemy)</a:t>
               </a:r>
             </a:p>
             <a:p>
@@ -2741,7 +2741,7 @@
                   <a:cs typeface="Arial" panose="020B0604020202020204" pitchFamily="34" charset="0"/>
                   <a:sym typeface="Helvetica Neue Medium"/>
                 </a:rPr>
-                <a:t>Fundamental of Java Script Programming (Udemy)</a:t>
+                <a:t>Qt 6 Core with C++ (Udemy)</a:t>
               </a:r>
             </a:p>
           </p:txBody>
@@ -2829,7 +2829,7 @@
             </a:ln>
             <a:extLst>
               <a:ext uri="{C572A759-6A51-4108-AA02-DFA0A04FC94B}">
-                <ma14:wrappingTextBoxFlag xmlns="" xmlns:m="http://schemas.openxmlformats.org/officeDocument/2006/math" xmlns:a14="http://schemas.microsoft.com/office/drawing/2010/main" xmlns:ma14="http://schemas.microsoft.com/office/mac/drawingml/2011/main" val="1"/>
+                <ma14:wrappingTextBoxFlag xmlns:ma14="http://schemas.microsoft.com/office/mac/drawingml/2011/main" xmlns:a14="http://schemas.microsoft.com/office/drawing/2010/main" xmlns:m="http://schemas.openxmlformats.org/officeDocument/2006/math" xmlns="" val="1"/>
               </a:ext>
             </a:extLst>
           </p:spPr>
@@ -2877,7 +2877,7 @@
             </a:ln>
             <a:extLst>
               <a:ext uri="{C572A759-6A51-4108-AA02-DFA0A04FC94B}">
-                <ma14:wrappingTextBoxFlag xmlns="" xmlns:m="http://schemas.openxmlformats.org/officeDocument/2006/math" xmlns:a14="http://schemas.microsoft.com/office/drawing/2010/main" xmlns:ma14="http://schemas.microsoft.com/office/mac/drawingml/2011/main" val="1"/>
+                <ma14:wrappingTextBoxFlag xmlns:ma14="http://schemas.microsoft.com/office/mac/drawingml/2011/main" xmlns:a14="http://schemas.microsoft.com/office/drawing/2010/main" xmlns:m="http://schemas.openxmlformats.org/officeDocument/2006/math" xmlns="" val="1"/>
               </a:ext>
             </a:extLst>
           </p:spPr>
@@ -2927,7 +2927,7 @@
         </p:nvGrpSpPr>
         <p:grpSpPr>
           <a:xfrm>
-            <a:off x="118872" y="3474720"/>
+            <a:off x="133287" y="3699560"/>
             <a:ext cx="2286000" cy="1416540"/>
             <a:chOff x="118872" y="2926080"/>
             <a:chExt cx="2286000" cy="1416540"/>
@@ -2952,7 +2952,7 @@
             </a:ln>
             <a:extLst>
               <a:ext uri="{C572A759-6A51-4108-AA02-DFA0A04FC94B}">
-                <ma14:wrappingTextBoxFlag xmlns="" xmlns:m="http://schemas.openxmlformats.org/officeDocument/2006/math" xmlns:a14="http://schemas.microsoft.com/office/drawing/2010/main" xmlns:ma14="http://schemas.microsoft.com/office/mac/drawingml/2011/main" val="1"/>
+                <ma14:wrappingTextBoxFlag xmlns:ma14="http://schemas.microsoft.com/office/mac/drawingml/2011/main" xmlns:a14="http://schemas.microsoft.com/office/drawing/2010/main" xmlns:m="http://schemas.openxmlformats.org/officeDocument/2006/math" xmlns="" val="1"/>
               </a:ext>
             </a:extLst>
           </p:spPr>
@@ -3000,7 +3000,7 @@
             </a:ln>
             <a:extLst>
               <a:ext uri="{C572A759-6A51-4108-AA02-DFA0A04FC94B}">
-                <ma14:wrappingTextBoxFlag xmlns="" xmlns:m="http://schemas.openxmlformats.org/officeDocument/2006/math" xmlns:a14="http://schemas.microsoft.com/office/drawing/2010/main" xmlns:ma14="http://schemas.microsoft.com/office/mac/drawingml/2011/main" val="1"/>
+                <ma14:wrappingTextBoxFlag xmlns:ma14="http://schemas.microsoft.com/office/mac/drawingml/2011/main" xmlns:a14="http://schemas.microsoft.com/office/drawing/2010/main" xmlns:m="http://schemas.openxmlformats.org/officeDocument/2006/math" xmlns="" val="1"/>
               </a:ext>
             </a:extLst>
           </p:spPr>
@@ -3207,8 +3207,8 @@
         </p:nvSpPr>
         <p:spPr>
           <a:xfrm>
-            <a:off x="78845" y="244258"/>
-            <a:ext cx="1488838" cy="1153818"/>
+            <a:off x="78844" y="244257"/>
+            <a:ext cx="1567049" cy="1391326"/>
           </a:xfrm>
           <a:prstGeom prst="rect">
             <a:avLst/>
@@ -3274,7 +3274,7 @@
         </p:nvGrpSpPr>
         <p:grpSpPr>
           <a:xfrm>
-            <a:off x="129654" y="1691640"/>
+            <a:off x="178489" y="1808644"/>
             <a:ext cx="2103120" cy="184453"/>
             <a:chOff x="311909" y="1900025"/>
             <a:chExt cx="2048723" cy="199824"/>
@@ -3372,7 +3372,7 @@
             <a:fontRef idx="none"/>
           </p:style>
           <p:txBody>
-            <a:bodyPr rot="0" spcFirstLastPara="1" vertOverflow="overflow" horzOverflow="overflow" vert="horz" wrap="square" lIns="28025" tIns="28025" rIns="28025" bIns="28025" numCol="1" spcCol="38100" rtlCol="0" anchor="ctr">
+            <a:bodyPr rot="0" spcFirstLastPara="1" vertOverflow="overflow" horzOverflow="overflow" vert="horz" wrap="square" lIns="28800" tIns="28025" rIns="28025" bIns="28025" numCol="1" spcCol="38100" rtlCol="0" anchor="ctr">
               <a:spAutoFit/>
             </a:bodyPr>
             <a:lstStyle/>
@@ -3408,7 +3408,7 @@
         </p:nvGrpSpPr>
         <p:grpSpPr>
           <a:xfrm>
-            <a:off x="119981" y="2423160"/>
+            <a:off x="196142" y="2771124"/>
             <a:ext cx="2103120" cy="212766"/>
             <a:chOff x="287386" y="2262490"/>
             <a:chExt cx="2450008" cy="230496"/>
@@ -3492,7 +3492,7 @@
             <a:fontRef idx="none"/>
           </p:style>
           <p:txBody>
-            <a:bodyPr rot="0" spcFirstLastPara="1" vertOverflow="overflow" horzOverflow="overflow" vert="horz" wrap="square" lIns="28025" tIns="28025" rIns="28025" bIns="28025" numCol="1" spcCol="38100" rtlCol="0" anchor="ctr">
+            <a:bodyPr rot="0" spcFirstLastPara="1" vertOverflow="overflow" horzOverflow="overflow" vert="horz" wrap="square" lIns="28800" tIns="28025" rIns="28025" bIns="28025" numCol="1" spcCol="38100" rtlCol="0" anchor="ctr">
               <a:spAutoFit/>
             </a:bodyPr>
             <a:lstStyle/>
@@ -3549,7 +3549,7 @@
         </p:nvGrpSpPr>
         <p:grpSpPr>
           <a:xfrm>
-            <a:off x="125286" y="2011680"/>
+            <a:off x="178489" y="2256487"/>
             <a:ext cx="2103120" cy="236861"/>
             <a:chOff x="307176" y="2204863"/>
             <a:chExt cx="1803559" cy="256599"/>
@@ -3676,7 +3676,7 @@
             <a:fontRef idx="none"/>
           </p:style>
           <p:txBody>
-            <a:bodyPr rot="0" spcFirstLastPara="1" vertOverflow="overflow" horzOverflow="overflow" vert="horz" wrap="square" lIns="28025" tIns="28025" rIns="28025" bIns="28025" numCol="1" spcCol="38100" rtlCol="0" anchor="ctr">
+            <a:bodyPr rot="0" spcFirstLastPara="1" vertOverflow="overflow" horzOverflow="overflow" vert="horz" wrap="square" lIns="28800" tIns="28025" rIns="28025" bIns="28025" numCol="1" spcCol="38100" rtlCol="0" anchor="ctr">
               <a:spAutoFit/>
             </a:bodyPr>
             <a:lstStyle/>
@@ -3712,7 +3712,7 @@
         </p:nvGrpSpPr>
         <p:grpSpPr>
           <a:xfrm>
-            <a:off x="119980" y="2743200"/>
+            <a:off x="178489" y="3242854"/>
             <a:ext cx="2103120" cy="312308"/>
             <a:chOff x="301429" y="2832651"/>
             <a:chExt cx="2394563" cy="338333"/>
@@ -3796,7 +3796,7 @@
             </a:fontRef>
           </p:style>
           <p:txBody>
-            <a:bodyPr rot="0" spcFirstLastPara="1" vertOverflow="overflow" horzOverflow="overflow" vert="horz" wrap="square" lIns="28025" tIns="28025" rIns="28025" bIns="28025" numCol="1" spcCol="38100" rtlCol="0" anchor="ctr">
+            <a:bodyPr rot="0" spcFirstLastPara="1" vertOverflow="overflow" horzOverflow="overflow" vert="horz" wrap="square" lIns="28800" tIns="28025" rIns="28025" bIns="28025" numCol="1" spcCol="38100" rtlCol="0" anchor="ctr">
               <a:spAutoFit/>
             </a:bodyPr>
             <a:lstStyle/>
@@ -3919,7 +3919,7 @@
         </p:nvGrpSpPr>
         <p:grpSpPr>
           <a:xfrm>
-            <a:off x="2560320" y="3474720"/>
+            <a:off x="2560318" y="3829463"/>
             <a:ext cx="4206240" cy="1536237"/>
             <a:chOff x="2560320" y="3246120"/>
             <a:chExt cx="4165600" cy="1536237"/>
@@ -3944,7 +3944,7 @@
             </a:ln>
             <a:extLst>
               <a:ext uri="{C572A759-6A51-4108-AA02-DFA0A04FC94B}">
-                <ma14:wrappingTextBoxFlag xmlns="" xmlns:m="http://schemas.openxmlformats.org/officeDocument/2006/math" xmlns:a14="http://schemas.microsoft.com/office/drawing/2010/main" xmlns:ma14="http://schemas.microsoft.com/office/mac/drawingml/2011/main" val="1"/>
+                <ma14:wrappingTextBoxFlag xmlns:ma14="http://schemas.microsoft.com/office/mac/drawingml/2011/main" xmlns:a14="http://schemas.microsoft.com/office/drawing/2010/main" xmlns:m="http://schemas.openxmlformats.org/officeDocument/2006/math" xmlns="" val="1"/>
               </a:ext>
             </a:extLst>
           </p:spPr>
@@ -4098,30 +4098,6 @@
                   <a:cs typeface="Arial" panose="020B0604020202020204" pitchFamily="34" charset="0"/>
                   <a:sym typeface="Helvetica Neue Medium"/>
                 </a:rPr>
-                <a:t>GPA</a:t>
-              </a:r>
-              <a:r>
-                <a:rPr lang="en-US" sz="831" b="0" dirty="0">
-                  <a:solidFill>
-                    <a:schemeClr val="tx1"/>
-                  </a:solidFill>
-                  <a:latin typeface="Arial" panose="020B0604020202020204" pitchFamily="34" charset="0"/>
-                  <a:ea typeface="Calibri" panose="020F0502020204030204" pitchFamily="34" charset="0"/>
-                  <a:cs typeface="Arial" panose="020B0604020202020204" pitchFamily="34" charset="0"/>
-                  <a:sym typeface="Helvetica Neue Medium"/>
-                </a:rPr>
-                <a:t>: 7.1, </a:t>
-              </a:r>
-              <a:r>
-                <a:rPr lang="en-US" sz="831" dirty="0">
-                  <a:solidFill>
-                    <a:schemeClr val="tx1"/>
-                  </a:solidFill>
-                  <a:latin typeface="Arial" panose="020B0604020202020204" pitchFamily="34" charset="0"/>
-                  <a:ea typeface="Calibri" panose="020F0502020204030204" pitchFamily="34" charset="0"/>
-                  <a:cs typeface="Arial" panose="020B0604020202020204" pitchFamily="34" charset="0"/>
-                  <a:sym typeface="Helvetica Neue Medium"/>
-                </a:rPr>
                 <a:t>Capstone</a:t>
               </a:r>
               <a:r>
@@ -4268,10 +4244,10 @@
         </p:nvGrpSpPr>
         <p:grpSpPr>
           <a:xfrm>
-            <a:off x="2555190" y="1371600"/>
-            <a:ext cx="4206240" cy="1731766"/>
-            <a:chOff x="2555190" y="1325880"/>
-            <a:chExt cx="4206240" cy="1731766"/>
+            <a:off x="2530203" y="1391524"/>
+            <a:ext cx="4206240" cy="2318585"/>
+            <a:chOff x="2555188" y="1325880"/>
+            <a:chExt cx="4206240" cy="2318585"/>
           </a:xfrm>
         </p:grpSpPr>
         <p:sp>
@@ -4293,7 +4269,7 @@
             </a:ln>
             <a:extLst>
               <a:ext uri="{C572A759-6A51-4108-AA02-DFA0A04FC94B}">
-                <ma14:wrappingTextBoxFlag xmlns="" xmlns:m="http://schemas.openxmlformats.org/officeDocument/2006/math" xmlns:a14="http://schemas.microsoft.com/office/drawing/2010/main" xmlns:ma14="http://schemas.microsoft.com/office/mac/drawingml/2011/main" val="1"/>
+                <ma14:wrappingTextBoxFlag xmlns:ma14="http://schemas.microsoft.com/office/mac/drawingml/2011/main" xmlns:a14="http://schemas.microsoft.com/office/drawing/2010/main" xmlns:m="http://schemas.openxmlformats.org/officeDocument/2006/math" xmlns="" val="1"/>
               </a:ext>
             </a:extLst>
           </p:spPr>
@@ -4367,8 +4343,8 @@
           </p:nvSpPr>
           <p:spPr>
             <a:xfrm>
-              <a:off x="2555190" y="1685817"/>
-              <a:ext cx="4206240" cy="1371829"/>
+              <a:off x="2555188" y="1718638"/>
+              <a:ext cx="4206240" cy="1925827"/>
             </a:xfrm>
             <a:prstGeom prst="rect">
               <a:avLst/>
@@ -4437,12 +4413,9 @@
               </a:r>
             </a:p>
             <a:p>
-              <a:pPr marL="158265" indent="-158265" algn="just" defTabSz="556127">
-                <a:buFont typeface="Arial" panose="020B0604020202020204" pitchFamily="34" charset="0"/>
-                <a:buChar char="•"/>
-              </a:pPr>
-              <a:r>
-                <a:rPr lang="en-US" sz="831" b="0" dirty="0">
+              <a:pPr algn="just" defTabSz="556127"/>
+              <a:r>
+                <a:rPr lang="en-US" sz="900" b="0" i="1" dirty="0" err="1">
                   <a:solidFill>
                     <a:schemeClr val="tx1"/>
                   </a:solidFill>
@@ -4451,10 +4424,10 @@
                   <a:cs typeface="Arial" panose="020B0604020202020204" pitchFamily="34" charset="0"/>
                   <a:sym typeface="Helvetica Neue Medium"/>
                 </a:rPr>
-                <a:t>Making C++ projects base on </a:t>
-              </a:r>
-              <a:r>
-                <a:rPr lang="en-US" sz="831" dirty="0">
+                <a:t>Yanmar</a:t>
+              </a:r>
+              <a:r>
+                <a:rPr lang="en-US" sz="900" b="0" i="1" dirty="0">
                   <a:solidFill>
                     <a:schemeClr val="tx1"/>
                   </a:solidFill>
@@ -4463,10 +4436,13 @@
                   <a:cs typeface="Arial" panose="020B0604020202020204" pitchFamily="34" charset="0"/>
                   <a:sym typeface="Helvetica Neue Medium"/>
                 </a:rPr>
-                <a:t>OOP </a:t>
-              </a:r>
-              <a:r>
-                <a:rPr lang="en-US" sz="831" b="0" dirty="0">
+                <a:t> Project</a:t>
+              </a:r>
+            </a:p>
+            <a:p>
+              <a:pPr algn="just" defTabSz="556127"/>
+              <a:r>
+                <a:rPr lang="en-US" sz="900" b="0" dirty="0">
                   <a:solidFill>
                     <a:schemeClr val="tx1"/>
                   </a:solidFill>
@@ -4475,31 +4451,7 @@
                   <a:cs typeface="Arial" panose="020B0604020202020204" pitchFamily="34" charset="0"/>
                   <a:sym typeface="Helvetica Neue Medium"/>
                 </a:rPr>
-                <a:t>model and learned </a:t>
-              </a:r>
-              <a:r>
-                <a:rPr lang="en-US" sz="831" dirty="0">
-                  <a:solidFill>
-                    <a:schemeClr val="tx1"/>
-                  </a:solidFill>
-                  <a:latin typeface="Arial" panose="020B0604020202020204" pitchFamily="34" charset="0"/>
-                  <a:ea typeface="Calibri" panose="020F0502020204030204" pitchFamily="34" charset="0"/>
-                  <a:cs typeface="Arial" panose="020B0604020202020204" pitchFamily="34" charset="0"/>
-                  <a:sym typeface="Helvetica Neue Medium"/>
-                </a:rPr>
-                <a:t>Unit Socket protocol</a:t>
-              </a:r>
-              <a:r>
-                <a:rPr lang="en-US" sz="831" b="0" dirty="0">
-                  <a:solidFill>
-                    <a:schemeClr val="tx1"/>
-                  </a:solidFill>
-                  <a:latin typeface="Arial" panose="020B0604020202020204" pitchFamily="34" charset="0"/>
-                  <a:ea typeface="Calibri" panose="020F0502020204030204" pitchFamily="34" charset="0"/>
-                  <a:cs typeface="Arial" panose="020B0604020202020204" pitchFamily="34" charset="0"/>
-                  <a:sym typeface="Helvetica Neue Medium"/>
-                </a:rPr>
-                <a:t> for Embedded System Programming.</a:t>
+                <a:t>This project built a system on tractor for interacting with physical devices on it using CAN bus as standard transmitters for system.</a:t>
               </a:r>
             </a:p>
             <a:p>
@@ -4517,10 +4469,10 @@
                   <a:cs typeface="Arial" panose="020B0604020202020204" pitchFamily="34" charset="0"/>
                   <a:sym typeface="Helvetica Neue Medium"/>
                 </a:rPr>
-                <a:t>Built Automotive Embedded System using </a:t>
-              </a:r>
-              <a:r>
-                <a:rPr lang="en-US" sz="831" dirty="0">
+                <a:t>Implement UI of Screen based on </a:t>
+              </a:r>
+              <a:r>
+                <a:rPr lang="en-US" sz="831" b="0" dirty="0" err="1">
                   <a:solidFill>
                     <a:schemeClr val="tx1"/>
                   </a:solidFill>
@@ -4529,7 +4481,7 @@
                   <a:cs typeface="Arial" panose="020B0604020202020204" pitchFamily="34" charset="0"/>
                   <a:sym typeface="Helvetica Neue Medium"/>
                 </a:rPr>
-                <a:t>CAN bus protocol</a:t>
+                <a:t>Projektor</a:t>
               </a:r>
               <a:r>
                 <a:rPr lang="en-US" sz="831" b="0" dirty="0">
@@ -4541,67 +4493,7 @@
                   <a:cs typeface="Arial" panose="020B0604020202020204" pitchFamily="34" charset="0"/>
                   <a:sym typeface="Helvetica Neue Medium"/>
                 </a:rPr>
-                <a:t> with </a:t>
-              </a:r>
-              <a:r>
-                <a:rPr lang="en-US" sz="831" dirty="0">
-                  <a:solidFill>
-                    <a:schemeClr val="tx1"/>
-                  </a:solidFill>
-                  <a:latin typeface="Arial" panose="020B0604020202020204" pitchFamily="34" charset="0"/>
-                  <a:ea typeface="Calibri" panose="020F0502020204030204" pitchFamily="34" charset="0"/>
-                  <a:cs typeface="Arial" panose="020B0604020202020204" pitchFamily="34" charset="0"/>
-                  <a:sym typeface="Helvetica Neue Medium"/>
-                </a:rPr>
-                <a:t>Boost Asia</a:t>
-              </a:r>
-              <a:r>
-                <a:rPr lang="en-US" sz="831" b="0" dirty="0">
-                  <a:solidFill>
-                    <a:schemeClr val="tx1"/>
-                  </a:solidFill>
-                  <a:latin typeface="Arial" panose="020B0604020202020204" pitchFamily="34" charset="0"/>
-                  <a:ea typeface="Calibri" panose="020F0502020204030204" pitchFamily="34" charset="0"/>
-                  <a:cs typeface="Arial" panose="020B0604020202020204" pitchFamily="34" charset="0"/>
-                  <a:sym typeface="Helvetica Neue Medium"/>
-                </a:rPr>
-                <a:t> library for communicating between physical devices on car on </a:t>
-              </a:r>
-              <a:r>
-                <a:rPr lang="en-US" sz="831" dirty="0">
-                  <a:solidFill>
-                    <a:schemeClr val="tx1"/>
-                  </a:solidFill>
-                  <a:latin typeface="Arial" panose="020B0604020202020204" pitchFamily="34" charset="0"/>
-                  <a:ea typeface="Calibri" panose="020F0502020204030204" pitchFamily="34" charset="0"/>
-                  <a:cs typeface="Arial" panose="020B0604020202020204" pitchFamily="34" charset="0"/>
-                  <a:sym typeface="Helvetica Neue Medium"/>
-                </a:rPr>
-                <a:t>Linux Kernel </a:t>
-              </a:r>
-              <a:r>
-                <a:rPr lang="en-US" sz="831" b="0" dirty="0">
-                  <a:solidFill>
-                    <a:schemeClr val="tx1"/>
-                  </a:solidFill>
-                  <a:latin typeface="Arial" panose="020B0604020202020204" pitchFamily="34" charset="0"/>
-                  <a:ea typeface="Calibri" panose="020F0502020204030204" pitchFamily="34" charset="0"/>
-                  <a:cs typeface="Arial" panose="020B0604020202020204" pitchFamily="34" charset="0"/>
-                  <a:sym typeface="Helvetica Neue Medium"/>
-                </a:rPr>
-                <a:t>using </a:t>
-              </a:r>
-              <a:r>
-                <a:rPr lang="en-US" sz="831" dirty="0">
-                  <a:solidFill>
-                    <a:schemeClr val="tx1"/>
-                  </a:solidFill>
-                  <a:latin typeface="Arial" panose="020B0604020202020204" pitchFamily="34" charset="0"/>
-                  <a:ea typeface="Calibri" panose="020F0502020204030204" pitchFamily="34" charset="0"/>
-                  <a:cs typeface="Arial" panose="020B0604020202020204" pitchFamily="34" charset="0"/>
-                  <a:sym typeface="Helvetica Neue Medium"/>
-                </a:rPr>
-                <a:t>C++.</a:t>
+                <a:t> Framework and Interaction with UI by JavaScript on Tractor.</a:t>
               </a:r>
             </a:p>
             <a:p>
@@ -4619,31 +4511,7 @@
                   <a:cs typeface="Arial" panose="020B0604020202020204" pitchFamily="34" charset="0"/>
                   <a:sym typeface="Helvetica Neue Medium"/>
                 </a:rPr>
-                <a:t>Designed layout of screen using </a:t>
-              </a:r>
-              <a:r>
-                <a:rPr lang="en-US" sz="831" dirty="0">
-                  <a:solidFill>
-                    <a:schemeClr val="tx1"/>
-                  </a:solidFill>
-                  <a:latin typeface="Arial" panose="020B0604020202020204" pitchFamily="34" charset="0"/>
-                  <a:ea typeface="Calibri" panose="020F0502020204030204" pitchFamily="34" charset="0"/>
-                  <a:cs typeface="Arial" panose="020B0604020202020204" pitchFamily="34" charset="0"/>
-                  <a:sym typeface="Helvetica Neue Medium"/>
-                </a:rPr>
-                <a:t>Java Script</a:t>
-              </a:r>
-              <a:r>
-                <a:rPr lang="en-US" sz="831" b="0" dirty="0">
-                  <a:solidFill>
-                    <a:schemeClr val="tx1"/>
-                  </a:solidFill>
-                  <a:latin typeface="Arial" panose="020B0604020202020204" pitchFamily="34" charset="0"/>
-                  <a:ea typeface="Calibri" panose="020F0502020204030204" pitchFamily="34" charset="0"/>
-                  <a:cs typeface="Arial" panose="020B0604020202020204" pitchFamily="34" charset="0"/>
-                  <a:sym typeface="Helvetica Neue Medium"/>
-                </a:rPr>
-                <a:t>.</a:t>
+                <a:t>Design and Implement CRC Checksum for system</a:t>
               </a:r>
             </a:p>
             <a:p>
@@ -4661,8 +4529,17 @@
                   <a:cs typeface="Arial" panose="020B0604020202020204" pitchFamily="34" charset="0"/>
                   <a:sym typeface="Helvetica Neue Medium"/>
                 </a:rPr>
-                <a:t>Network programming on Linux environment.</a:t>
-              </a:r>
+                <a:t>Implement Session Layer of OSI model using Boost Library on Linux Kernel</a:t>
+              </a:r>
+              <a:endParaRPr lang="en-US" sz="831" dirty="0">
+                <a:solidFill>
+                  <a:schemeClr val="tx1"/>
+                </a:solidFill>
+                <a:latin typeface="Arial" panose="020B0604020202020204" pitchFamily="34" charset="0"/>
+                <a:ea typeface="Calibri" panose="020F0502020204030204" pitchFamily="34" charset="0"/>
+                <a:cs typeface="Arial" panose="020B0604020202020204" pitchFamily="34" charset="0"/>
+                <a:sym typeface="Helvetica Neue Medium"/>
+              </a:endParaRPr>
             </a:p>
             <a:p>
               <a:pPr marL="158265" indent="-158265" algn="just" defTabSz="556127">
@@ -4679,10 +4556,13 @@
                   <a:cs typeface="Arial" panose="020B0604020202020204" pitchFamily="34" charset="0"/>
                   <a:sym typeface="Helvetica Neue Medium"/>
                 </a:rPr>
-                <a:t>Built </a:t>
-              </a:r>
-              <a:r>
-                <a:rPr lang="en-US" sz="831" dirty="0">
+                <a:t>Writing UT, IT and Automation tests for system.</a:t>
+              </a:r>
+            </a:p>
+            <a:p>
+              <a:pPr algn="just" defTabSz="556127"/>
+              <a:r>
+                <a:rPr lang="en-US" sz="900" b="0" i="1" dirty="0">
                   <a:solidFill>
                     <a:schemeClr val="tx1"/>
                   </a:solidFill>
@@ -4691,8 +4571,14 @@
                   <a:cs typeface="Arial" panose="020B0604020202020204" pitchFamily="34" charset="0"/>
                   <a:sym typeface="Helvetica Neue Medium"/>
                 </a:rPr>
-                <a:t>C++</a:t>
-              </a:r>
+                <a:t>Aisin Project</a:t>
+              </a:r>
+            </a:p>
+            <a:p>
+              <a:pPr marL="158265" indent="-158265" algn="just" defTabSz="556127">
+                <a:buFont typeface="Arial" panose="020B0604020202020204" pitchFamily="34" charset="0"/>
+                <a:buChar char="•"/>
+              </a:pPr>
               <a:r>
                 <a:rPr lang="en-US" sz="831" b="0" dirty="0">
                   <a:solidFill>
@@ -4703,20 +4589,14 @@
                   <a:cs typeface="Arial" panose="020B0604020202020204" pitchFamily="34" charset="0"/>
                   <a:sym typeface="Helvetica Neue Medium"/>
                 </a:rPr>
-                <a:t> code on </a:t>
-              </a:r>
-              <a:r>
-                <a:rPr lang="en-US" sz="831" dirty="0">
-                  <a:solidFill>
-                    <a:schemeClr val="tx1"/>
-                  </a:solidFill>
-                  <a:latin typeface="Arial" panose="020B0604020202020204" pitchFamily="34" charset="0"/>
-                  <a:ea typeface="Calibri" panose="020F0502020204030204" pitchFamily="34" charset="0"/>
-                  <a:cs typeface="Arial" panose="020B0604020202020204" pitchFamily="34" charset="0"/>
-                  <a:sym typeface="Helvetica Neue Medium"/>
-                </a:rPr>
-                <a:t>Linux Environment</a:t>
-              </a:r>
+                <a:t>Built functional model to receive data from service and handle to display UI</a:t>
+              </a:r>
+            </a:p>
+            <a:p>
+              <a:pPr marL="158265" indent="-158265" algn="just" defTabSz="556127">
+                <a:buFont typeface="Arial" panose="020B0604020202020204" pitchFamily="34" charset="0"/>
+                <a:buChar char="•"/>
+              </a:pPr>
               <a:r>
                 <a:rPr lang="en-US" sz="831" b="0" dirty="0">
                   <a:solidFill>
@@ -4727,10 +4607,10 @@
                   <a:cs typeface="Arial" panose="020B0604020202020204" pitchFamily="34" charset="0"/>
                   <a:sym typeface="Helvetica Neue Medium"/>
                 </a:rPr>
-                <a:t> using </a:t>
-              </a:r>
-              <a:r>
-                <a:rPr lang="vi-VN" sz="831" noProof="1">
+                <a:t>Implement UI using </a:t>
+              </a:r>
+              <a:r>
+                <a:rPr lang="en-US" sz="831" b="0" dirty="0" err="1">
                   <a:solidFill>
                     <a:schemeClr val="tx1"/>
                   </a:solidFill>
@@ -4739,7 +4619,7 @@
                   <a:cs typeface="Arial" panose="020B0604020202020204" pitchFamily="34" charset="0"/>
                   <a:sym typeface="Helvetica Neue Medium"/>
                 </a:rPr>
-                <a:t>CMake</a:t>
+                <a:t>qml</a:t>
               </a:r>
               <a:r>
                 <a:rPr lang="en-US" sz="831" b="0" dirty="0">
@@ -4751,8 +4631,71 @@
                   <a:cs typeface="Arial" panose="020B0604020202020204" pitchFamily="34" charset="0"/>
                   <a:sym typeface="Helvetica Neue Medium"/>
                 </a:rPr>
-                <a:t>.</a:t>
-              </a:r>
+                <a:t> </a:t>
+              </a:r>
+              <a:r>
+                <a:rPr lang="en-US" sz="831" b="0" dirty="0" err="1">
+                  <a:solidFill>
+                    <a:schemeClr val="tx1"/>
+                  </a:solidFill>
+                  <a:latin typeface="Arial" panose="020B0604020202020204" pitchFamily="34" charset="0"/>
+                  <a:ea typeface="Calibri" panose="020F0502020204030204" pitchFamily="34" charset="0"/>
+                  <a:cs typeface="Arial" panose="020B0604020202020204" pitchFamily="34" charset="0"/>
+                  <a:sym typeface="Helvetica Neue Medium"/>
+                </a:rPr>
+                <a:t>QtQuick</a:t>
+              </a:r>
+              <a:r>
+                <a:rPr lang="en-US" sz="831" b="0" dirty="0">
+                  <a:solidFill>
+                    <a:schemeClr val="tx1"/>
+                  </a:solidFill>
+                  <a:latin typeface="Arial" panose="020B0604020202020204" pitchFamily="34" charset="0"/>
+                  <a:ea typeface="Calibri" panose="020F0502020204030204" pitchFamily="34" charset="0"/>
+                  <a:cs typeface="Arial" panose="020B0604020202020204" pitchFamily="34" charset="0"/>
+                  <a:sym typeface="Helvetica Neue Medium"/>
+                </a:rPr>
+                <a:t> and JavaScript</a:t>
+              </a:r>
+            </a:p>
+            <a:p>
+              <a:pPr marL="158265" indent="-158265" algn="just" defTabSz="556127">
+                <a:buFont typeface="Arial" panose="020B0604020202020204" pitchFamily="34" charset="0"/>
+                <a:buChar char="•"/>
+              </a:pPr>
+              <a:r>
+                <a:rPr lang="en-US" sz="831" b="0" dirty="0">
+                  <a:solidFill>
+                    <a:schemeClr val="tx1"/>
+                  </a:solidFill>
+                  <a:latin typeface="Arial" panose="020B0604020202020204" pitchFamily="34" charset="0"/>
+                  <a:ea typeface="Calibri" panose="020F0502020204030204" pitchFamily="34" charset="0"/>
+                  <a:cs typeface="Arial" panose="020B0604020202020204" pitchFamily="34" charset="0"/>
+                  <a:sym typeface="Helvetica Neue Medium"/>
+                </a:rPr>
+                <a:t>Create Common Component as Template for UI system when using </a:t>
+              </a:r>
+              <a:r>
+                <a:rPr lang="en-US" sz="831" b="0" dirty="0" err="1">
+                  <a:solidFill>
+                    <a:schemeClr val="tx1"/>
+                  </a:solidFill>
+                  <a:latin typeface="Arial" panose="020B0604020202020204" pitchFamily="34" charset="0"/>
+                  <a:ea typeface="Calibri" panose="020F0502020204030204" pitchFamily="34" charset="0"/>
+                  <a:cs typeface="Arial" panose="020B0604020202020204" pitchFamily="34" charset="0"/>
+                  <a:sym typeface="Helvetica Neue Medium"/>
+                </a:rPr>
+                <a:t>qml</a:t>
+              </a:r>
+              <a:endParaRPr lang="en-US" sz="831" b="0" dirty="0">
+                <a:solidFill>
+                  <a:schemeClr val="tx1"/>
+                </a:solidFill>
+                <a:latin typeface="Arial" panose="020B0604020202020204" pitchFamily="34" charset="0"/>
+                <a:ea typeface="Calibri" panose="020F0502020204030204" pitchFamily="34" charset="0"/>
+                <a:cs typeface="Arial" panose="020B0604020202020204" pitchFamily="34" charset="0"/>
+                <a:sym typeface="Helvetica Neue Medium"/>
+              </a:endParaRPr>
             </a:p>
           </p:txBody>
         </p:sp>
@@ -4771,7 +4714,7 @@
         </p:nvGrpSpPr>
         <p:grpSpPr>
           <a:xfrm>
-            <a:off x="2553453" y="5120638"/>
+            <a:off x="2553452" y="5475860"/>
             <a:ext cx="4167387" cy="1413017"/>
             <a:chOff x="297804" y="6741699"/>
             <a:chExt cx="3908615" cy="1660957"/>
@@ -4796,7 +4739,7 @@
             </a:ln>
             <a:extLst>
               <a:ext uri="{C572A759-6A51-4108-AA02-DFA0A04FC94B}">
-                <ma14:wrappingTextBoxFlag xmlns="" xmlns:m="http://schemas.openxmlformats.org/officeDocument/2006/math" xmlns:a14="http://schemas.microsoft.com/office/drawing/2010/main" xmlns:ma14="http://schemas.microsoft.com/office/mac/drawingml/2011/main" val="1"/>
+                <ma14:wrappingTextBoxFlag xmlns:ma14="http://schemas.microsoft.com/office/mac/drawingml/2011/main" xmlns:a14="http://schemas.microsoft.com/office/drawing/2010/main" xmlns:m="http://schemas.openxmlformats.org/officeDocument/2006/math" xmlns="" val="1"/>
               </a:ext>
             </a:extLst>
           </p:spPr>
@@ -5252,7 +5195,7 @@
                   <a:cs typeface="Arial" panose="020B0604020202020204" pitchFamily="34" charset="0"/>
                   <a:sym typeface="Helvetica Neue Medium"/>
                 </a:rPr>
-                <a:t>MQTT/LORA</a:t>
+                <a:t>Unit Socket/Network</a:t>
               </a:r>
             </a:p>
             <a:p>
@@ -5270,7 +5213,7 @@
                   <a:cs typeface="Arial" panose="020B0604020202020204" pitchFamily="34" charset="0"/>
                   <a:sym typeface="Helvetica Neue Medium"/>
                 </a:rPr>
-                <a:t>Network/Unit Socket</a:t>
+                <a:t>Linux/Docker</a:t>
               </a:r>
             </a:p>
             <a:p>
@@ -5288,7 +5231,7 @@
                   <a:cs typeface="Arial" panose="020B0604020202020204" pitchFamily="34" charset="0"/>
                   <a:sym typeface="Helvetica Neue Medium"/>
                 </a:rPr>
-                <a:t>Linux/Docker</a:t>
+                <a:t>Memory Management</a:t>
               </a:r>
             </a:p>
             <a:p>
@@ -5306,7 +5249,7 @@
                   <a:cs typeface="Arial" panose="020B0604020202020204" pitchFamily="34" charset="0"/>
                   <a:sym typeface="Helvetica Neue Medium"/>
                 </a:rPr>
-                <a:t>Git</a:t>
+                <a:t>Pattern Design</a:t>
               </a:r>
             </a:p>
             <a:p>
@@ -5315,7 +5258,7 @@
                 <a:buChar char="•"/>
               </a:pPr>
               <a:r>
-                <a:rPr lang="en-US" sz="923" b="0" dirty="0">
+                <a:rPr lang="en-US" sz="923" b="0" noProof="1">
                   <a:solidFill>
                     <a:schemeClr val="tx1"/>
                   </a:solidFill>
@@ -5324,7 +5267,7 @@
                   <a:cs typeface="Arial" panose="020B0604020202020204" pitchFamily="34" charset="0"/>
                   <a:sym typeface="Helvetica Neue Medium"/>
                 </a:rPr>
-                <a:t>VS Code/Visual Studio</a:t>
+                <a:t>Qt / VS Code</a:t>
               </a:r>
             </a:p>
             <a:p>
@@ -5333,7 +5276,7 @@
                 <a:buChar char="•"/>
               </a:pPr>
               <a:r>
-                <a:rPr lang="en-US" sz="923" b="0" noProof="1">
+                <a:rPr lang="en-US" sz="923" b="0" dirty="0">
                   <a:solidFill>
                     <a:schemeClr val="tx1"/>
                   </a:solidFill>
@@ -5342,8 +5285,17 @@
                   <a:cs typeface="Arial" panose="020B0604020202020204" pitchFamily="34" charset="0"/>
                   <a:sym typeface="Helvetica Neue Medium"/>
                 </a:rPr>
-                <a:t>Sqlite</a:t>
-              </a:r>
+                <a:t>Git</a:t>
+              </a:r>
+              <a:endParaRPr lang="en-US" sz="923" b="0" noProof="1">
+                <a:solidFill>
+                  <a:schemeClr val="tx1"/>
+                </a:solidFill>
+                <a:latin typeface="Arial" panose="020B0604020202020204" pitchFamily="34" charset="0"/>
+                <a:ea typeface="Calibri" panose="020F0502020204030204" pitchFamily="34" charset="0"/>
+                <a:cs typeface="Arial" panose="020B0604020202020204" pitchFamily="34" charset="0"/>
+                <a:sym typeface="Helvetica Neue Medium"/>
+              </a:endParaRPr>
             </a:p>
           </p:txBody>
         </p:sp>
@@ -5362,7 +5314,7 @@
         </p:nvGrpSpPr>
         <p:grpSpPr>
           <a:xfrm>
-            <a:off x="118871" y="5120640"/>
+            <a:off x="118871" y="5474741"/>
             <a:ext cx="2286000" cy="1132488"/>
             <a:chOff x="118871" y="4572000"/>
             <a:chExt cx="2286000" cy="1132488"/>
@@ -5393,7 +5345,7 @@
             </a:ln>
             <a:extLst>
               <a:ext uri="{C572A759-6A51-4108-AA02-DFA0A04FC94B}">
-                <ma14:wrappingTextBoxFlag xmlns="" xmlns:m="http://schemas.openxmlformats.org/officeDocument/2006/math" xmlns:a14="http://schemas.microsoft.com/office/drawing/2010/main" xmlns:ma14="http://schemas.microsoft.com/office/mac/drawingml/2011/main" val="1"/>
+                <ma14:wrappingTextBoxFlag xmlns:ma14="http://schemas.microsoft.com/office/mac/drawingml/2011/main" xmlns:a14="http://schemas.microsoft.com/office/drawing/2010/main" xmlns:m="http://schemas.openxmlformats.org/officeDocument/2006/math" xmlns="" val="1"/>
               </a:ext>
             </a:extLst>
           </p:spPr>
@@ -5545,7 +5497,7 @@
         </p:nvGrpSpPr>
         <p:grpSpPr>
           <a:xfrm>
-            <a:off x="129667" y="8046717"/>
+            <a:off x="133315" y="8133023"/>
             <a:ext cx="2209546" cy="560857"/>
             <a:chOff x="331299" y="6025728"/>
             <a:chExt cx="2064656" cy="544922"/>
@@ -5662,7 +5614,7 @@
               </a:ln>
               <a:extLst>
                 <a:ext uri="{C572A759-6A51-4108-AA02-DFA0A04FC94B}">
-                  <ma14:wrappingTextBoxFlag xmlns="" xmlns:m="http://schemas.openxmlformats.org/officeDocument/2006/math" xmlns:a14="http://schemas.microsoft.com/office/drawing/2010/main" xmlns:ma14="http://schemas.microsoft.com/office/mac/drawingml/2011/main" val="1"/>
+                  <ma14:wrappingTextBoxFlag xmlns:ma14="http://schemas.microsoft.com/office/mac/drawingml/2011/main" xmlns:a14="http://schemas.microsoft.com/office/drawing/2010/main" xmlns:m="http://schemas.openxmlformats.org/officeDocument/2006/math" xmlns="" val="1"/>
                 </a:ext>
               </a:extLst>
             </p:spPr>
@@ -5737,7 +5689,7 @@
         </p:nvGrpSpPr>
         <p:grpSpPr>
           <a:xfrm>
-            <a:off x="2560318" y="8046717"/>
+            <a:off x="2549563" y="8139679"/>
             <a:ext cx="4206242" cy="848440"/>
             <a:chOff x="299123" y="5984209"/>
             <a:chExt cx="2307495" cy="919143"/>
@@ -5768,7 +5720,7 @@
             </a:ln>
             <a:extLst>
               <a:ext uri="{C572A759-6A51-4108-AA02-DFA0A04FC94B}">
-                <ma14:wrappingTextBoxFlag xmlns="" xmlns:m="http://schemas.openxmlformats.org/officeDocument/2006/math" xmlns:a14="http://schemas.microsoft.com/office/drawing/2010/main" xmlns:ma14="http://schemas.microsoft.com/office/mac/drawingml/2011/main" val="1"/>
+                <ma14:wrappingTextBoxFlag xmlns:ma14="http://schemas.microsoft.com/office/mac/drawingml/2011/main" xmlns:a14="http://schemas.microsoft.com/office/drawing/2010/main" xmlns:m="http://schemas.openxmlformats.org/officeDocument/2006/math" xmlns="" val="1"/>
               </a:ext>
             </a:extLst>
           </p:spPr>
@@ -5891,7 +5843,7 @@
                   <a:cs typeface="Arial" panose="020B0604020202020204" pitchFamily="34" charset="0"/>
                   <a:sym typeface="Helvetica Neue Medium"/>
                 </a:rPr>
-                <a:t>Solved 70 problems on LeetCode and continuing to solve</a:t>
+                <a:t>Solved 94 problems on LeetCode and continuing to solve</a:t>
               </a:r>
             </a:p>
             <a:p>
@@ -5944,10 +5896,10 @@
         </p:nvGrpSpPr>
         <p:grpSpPr>
           <a:xfrm>
-            <a:off x="118872" y="6675120"/>
-            <a:ext cx="2286000" cy="1253354"/>
-            <a:chOff x="118872" y="5667273"/>
-            <a:chExt cx="2286000" cy="1253354"/>
+            <a:off x="123815" y="6836483"/>
+            <a:ext cx="2287471" cy="1047291"/>
+            <a:chOff x="123815" y="5667273"/>
+            <a:chExt cx="2287471" cy="1047291"/>
           </a:xfrm>
         </p:grpSpPr>
         <p:sp>
@@ -5975,7 +5927,7 @@
             </a:ln>
             <a:extLst>
               <a:ext uri="{C572A759-6A51-4108-AA02-DFA0A04FC94B}">
-                <ma14:wrappingTextBoxFlag xmlns="" xmlns:m="http://schemas.openxmlformats.org/officeDocument/2006/math" xmlns:a14="http://schemas.microsoft.com/office/drawing/2010/main" xmlns:ma14="http://schemas.microsoft.com/office/mac/drawingml/2011/main" val="1"/>
+                <ma14:wrappingTextBoxFlag xmlns:ma14="http://schemas.microsoft.com/office/mac/drawingml/2011/main" xmlns:a14="http://schemas.microsoft.com/office/drawing/2010/main" xmlns:m="http://schemas.openxmlformats.org/officeDocument/2006/math" xmlns="" val="1"/>
               </a:ext>
             </a:extLst>
           </p:spPr>
@@ -6048,8 +6000,8 @@
           </p:nvSpPr>
           <p:spPr>
             <a:xfrm>
-              <a:off x="118872" y="6033033"/>
-              <a:ext cx="2286000" cy="887594"/>
+              <a:off x="125286" y="6034719"/>
+              <a:ext cx="2286000" cy="679845"/>
             </a:xfrm>
             <a:prstGeom prst="rect">
               <a:avLst/>
@@ -6099,7 +6051,7 @@
                   <a:cs typeface="Arial" panose="020B0604020202020204" pitchFamily="34" charset="0"/>
                   <a:sym typeface="Helvetica Neue Medium"/>
                 </a:rPr>
-                <a:t>Linux System Programming Techniques &amp; Concepts (40%)</a:t>
+                <a:t>Networking Fundamentals</a:t>
               </a:r>
             </a:p>
             <a:p>
@@ -6109,6 +6061,18 @@
                 </a:lnSpc>
               </a:pPr>
               <a:r>
+                <a:rPr lang="en-US" sz="900" b="0" dirty="0" err="1">
+                  <a:solidFill>
+                    <a:schemeClr val="tx1"/>
+                  </a:solidFill>
+                  <a:latin typeface="Arial" panose="020B0604020202020204" pitchFamily="34" charset="0"/>
+                  <a:ea typeface="Calibri" panose="020F0502020204030204" pitchFamily="34" charset="0"/>
+                  <a:cs typeface="Arial" panose="020B0604020202020204" pitchFamily="34" charset="0"/>
+                  <a:sym typeface="Helvetica Neue Medium"/>
+                </a:rPr>
+                <a:t>Autosar</a:t>
+              </a:r>
+              <a:r>
                 <a:rPr lang="en-US" sz="900" b="0" dirty="0">
                   <a:solidFill>
                     <a:schemeClr val="tx1"/>
@@ -6118,7 +6082,7 @@
                   <a:cs typeface="Arial" panose="020B0604020202020204" pitchFamily="34" charset="0"/>
                   <a:sym typeface="Helvetica Neue Medium"/>
                 </a:rPr>
-                <a:t>Microsoft Azure Fundamentals (25%)</a:t>
+                <a:t> Architecture</a:t>
               </a:r>
             </a:p>
             <a:p>
@@ -6128,6 +6092,18 @@
                 </a:lnSpc>
               </a:pPr>
               <a:r>
+                <a:rPr lang="en-US" sz="900" b="0" dirty="0" err="1">
+                  <a:solidFill>
+                    <a:schemeClr val="tx1"/>
+                  </a:solidFill>
+                  <a:latin typeface="Arial" panose="020B0604020202020204" pitchFamily="34" charset="0"/>
+                  <a:ea typeface="Calibri" panose="020F0502020204030204" pitchFamily="34" charset="0"/>
+                  <a:cs typeface="Arial" panose="020B0604020202020204" pitchFamily="34" charset="0"/>
+                  <a:sym typeface="Helvetica Neue Medium"/>
+                </a:rPr>
+                <a:t>Winform</a:t>
+              </a:r>
+              <a:r>
                 <a:rPr lang="en-US" sz="900" b="0" dirty="0">
                   <a:solidFill>
                     <a:schemeClr val="tx1"/>
@@ -6137,7 +6113,7 @@
                   <a:cs typeface="Arial" panose="020B0604020202020204" pitchFamily="34" charset="0"/>
                   <a:sym typeface="Helvetica Neue Medium"/>
                 </a:rPr>
-                <a:t>Pattern Design C++ (30%)</a:t>
+                <a:t> Application</a:t>
               </a:r>
             </a:p>
           </p:txBody>

</xml_diff>